<commit_message>
PPT en la recta final
</commit_message>
<xml_diff>
--- a/Presentacion.pptx
+++ b/Presentacion.pptx
@@ -8,13 +8,14 @@
     <p:sldId id="256" r:id="rId2"/>
     <p:sldId id="257" r:id="rId3"/>
     <p:sldId id="258" r:id="rId4"/>
-    <p:sldId id="259" r:id="rId5"/>
-    <p:sldId id="260" r:id="rId6"/>
-    <p:sldId id="261" r:id="rId7"/>
-    <p:sldId id="262" r:id="rId8"/>
-    <p:sldId id="263" r:id="rId9"/>
-    <p:sldId id="264" r:id="rId10"/>
-    <p:sldId id="265" r:id="rId11"/>
+    <p:sldId id="266" r:id="rId5"/>
+    <p:sldId id="259" r:id="rId6"/>
+    <p:sldId id="260" r:id="rId7"/>
+    <p:sldId id="261" r:id="rId8"/>
+    <p:sldId id="262" r:id="rId9"/>
+    <p:sldId id="263" r:id="rId10"/>
+    <p:sldId id="264" r:id="rId11"/>
+    <p:sldId id="265" r:id="rId12"/>
   </p:sldIdLst>
   <p:sldSz cx="9144000" cy="6858000" type="screen4x3"/>
   <p:notesSz cx="6858000" cy="9144000"/>
@@ -113,6 +114,22 @@
       </a:defRPr>
     </a:lvl9pPr>
   </p:defaultTextStyle>
+  <p:extLst>
+    <p:ext uri="{EFAFB233-063F-42B5-8137-9DF3F51BA10A}">
+      <p15:sldGuideLst xmlns:p15="http://schemas.microsoft.com/office/powerpoint/2012/main">
+        <p15:guide id="1" orient="horz" pos="2160">
+          <p15:clr>
+            <a:srgbClr val="A4A3A4"/>
+          </p15:clr>
+        </p15:guide>
+        <p15:guide id="2" pos="2880">
+          <p15:clr>
+            <a:srgbClr val="A4A3A4"/>
+          </p15:clr>
+        </p15:guide>
+      </p15:sldGuideLst>
+    </p:ext>
+  </p:extLst>
 </p:presentation>
 </file>
 
@@ -160,7 +177,7 @@
           </a:lstStyle>
           <a:p>
             <a:r>
-              <a:rPr lang="es-ES" smtClean="0"/>
+              <a:rPr lang="es-ES"/>
               <a:t>Haga clic para modificar el estilo de título del patrón</a:t>
             </a:r>
             <a:endParaRPr lang="en-US"/>
@@ -279,7 +296,7 @@
           </a:lstStyle>
           <a:p>
             <a:r>
-              <a:rPr lang="es-ES" smtClean="0"/>
+              <a:rPr lang="es-ES"/>
               <a:t>Haga clic para modificar el estilo de subtítulo del patrón</a:t>
             </a:r>
             <a:endParaRPr lang="en-US" dirty="0"/>
@@ -303,7 +320,7 @@
           <a:p>
             <a:fld id="{13FE1CB5-16EE-4C23-BA06-ACFB090D49E9}" type="datetimeFigureOut">
               <a:rPr lang="es-AR" smtClean="0"/>
-              <a:t>19/11/2018</a:t>
+              <a:t>22/11/2018</a:t>
             </a:fld>
             <a:endParaRPr lang="es-AR" dirty="0"/>
           </a:p>
@@ -392,7 +409,7 @@
           <a:lstStyle/>
           <a:p>
             <a:r>
-              <a:rPr lang="es-ES" smtClean="0"/>
+              <a:rPr lang="es-ES"/>
               <a:t>Haga clic para modificar el estilo de título del patrón</a:t>
             </a:r>
             <a:endParaRPr lang="en-US"/>
@@ -416,35 +433,35 @@
           <a:p>
             <a:pPr lvl="0"/>
             <a:r>
-              <a:rPr lang="es-ES" smtClean="0"/>
+              <a:rPr lang="es-ES"/>
               <a:t>Haga clic para modificar el estilo de texto del patrón</a:t>
             </a:r>
           </a:p>
           <a:p>
             <a:pPr lvl="1"/>
             <a:r>
-              <a:rPr lang="es-ES" smtClean="0"/>
+              <a:rPr lang="es-ES"/>
               <a:t>Segundo nivel</a:t>
             </a:r>
           </a:p>
           <a:p>
             <a:pPr lvl="2"/>
             <a:r>
-              <a:rPr lang="es-ES" smtClean="0"/>
+              <a:rPr lang="es-ES"/>
               <a:t>Tercer nivel</a:t>
             </a:r>
           </a:p>
           <a:p>
             <a:pPr lvl="3"/>
             <a:r>
-              <a:rPr lang="es-ES" smtClean="0"/>
+              <a:rPr lang="es-ES"/>
               <a:t>Cuarto nivel</a:t>
             </a:r>
           </a:p>
           <a:p>
             <a:pPr lvl="4"/>
             <a:r>
-              <a:rPr lang="es-ES" smtClean="0"/>
+              <a:rPr lang="es-ES"/>
               <a:t>Quinto nivel</a:t>
             </a:r>
             <a:endParaRPr lang="en-US"/>
@@ -468,7 +485,7 @@
           <a:p>
             <a:fld id="{13FE1CB5-16EE-4C23-BA06-ACFB090D49E9}" type="datetimeFigureOut">
               <a:rPr lang="es-AR" smtClean="0"/>
-              <a:t>19/11/2018</a:t>
+              <a:t>22/11/2018</a:t>
             </a:fld>
             <a:endParaRPr lang="es-AR" dirty="0"/>
           </a:p>
@@ -562,7 +579,7 @@
           <a:lstStyle/>
           <a:p>
             <a:r>
-              <a:rPr lang="es-ES" smtClean="0"/>
+              <a:rPr lang="es-ES"/>
               <a:t>Haga clic para modificar el estilo de título del patrón</a:t>
             </a:r>
             <a:endParaRPr lang="en-US"/>
@@ -591,35 +608,35 @@
           <a:p>
             <a:pPr lvl="0"/>
             <a:r>
-              <a:rPr lang="es-ES" smtClean="0"/>
+              <a:rPr lang="es-ES"/>
               <a:t>Haga clic para modificar el estilo de texto del patrón</a:t>
             </a:r>
           </a:p>
           <a:p>
             <a:pPr lvl="1"/>
             <a:r>
-              <a:rPr lang="es-ES" smtClean="0"/>
+              <a:rPr lang="es-ES"/>
               <a:t>Segundo nivel</a:t>
             </a:r>
           </a:p>
           <a:p>
             <a:pPr lvl="2"/>
             <a:r>
-              <a:rPr lang="es-ES" smtClean="0"/>
+              <a:rPr lang="es-ES"/>
               <a:t>Tercer nivel</a:t>
             </a:r>
           </a:p>
           <a:p>
             <a:pPr lvl="3"/>
             <a:r>
-              <a:rPr lang="es-ES" smtClean="0"/>
+              <a:rPr lang="es-ES"/>
               <a:t>Cuarto nivel</a:t>
             </a:r>
           </a:p>
           <a:p>
             <a:pPr lvl="4"/>
             <a:r>
-              <a:rPr lang="es-ES" smtClean="0"/>
+              <a:rPr lang="es-ES"/>
               <a:t>Quinto nivel</a:t>
             </a:r>
             <a:endParaRPr lang="en-US"/>
@@ -643,7 +660,7 @@
           <a:p>
             <a:fld id="{13FE1CB5-16EE-4C23-BA06-ACFB090D49E9}" type="datetimeFigureOut">
               <a:rPr lang="es-AR" smtClean="0"/>
-              <a:t>19/11/2018</a:t>
+              <a:t>22/11/2018</a:t>
             </a:fld>
             <a:endParaRPr lang="es-AR" dirty="0"/>
           </a:p>
@@ -732,7 +749,7 @@
           <a:lstStyle/>
           <a:p>
             <a:r>
-              <a:rPr lang="es-ES" smtClean="0"/>
+              <a:rPr lang="es-ES"/>
               <a:t>Haga clic para modificar el estilo de título del patrón</a:t>
             </a:r>
             <a:endParaRPr lang="en-US"/>
@@ -756,35 +773,35 @@
           <a:p>
             <a:pPr lvl="0"/>
             <a:r>
-              <a:rPr lang="es-ES" smtClean="0"/>
+              <a:rPr lang="es-ES"/>
               <a:t>Haga clic para modificar el estilo de texto del patrón</a:t>
             </a:r>
           </a:p>
           <a:p>
             <a:pPr lvl="1"/>
             <a:r>
-              <a:rPr lang="es-ES" smtClean="0"/>
+              <a:rPr lang="es-ES"/>
               <a:t>Segundo nivel</a:t>
             </a:r>
           </a:p>
           <a:p>
             <a:pPr lvl="2"/>
             <a:r>
-              <a:rPr lang="es-ES" smtClean="0"/>
+              <a:rPr lang="es-ES"/>
               <a:t>Tercer nivel</a:t>
             </a:r>
           </a:p>
           <a:p>
             <a:pPr lvl="3"/>
             <a:r>
-              <a:rPr lang="es-ES" smtClean="0"/>
+              <a:rPr lang="es-ES"/>
               <a:t>Cuarto nivel</a:t>
             </a:r>
           </a:p>
           <a:p>
             <a:pPr lvl="4"/>
             <a:r>
-              <a:rPr lang="es-ES" smtClean="0"/>
+              <a:rPr lang="es-ES"/>
               <a:t>Quinto nivel</a:t>
             </a:r>
             <a:endParaRPr lang="en-US" dirty="0"/>
@@ -808,7 +825,7 @@
           <a:p>
             <a:fld id="{13FE1CB5-16EE-4C23-BA06-ACFB090D49E9}" type="datetimeFigureOut">
               <a:rPr lang="es-AR" smtClean="0"/>
-              <a:t>19/11/2018</a:t>
+              <a:t>22/11/2018</a:t>
             </a:fld>
             <a:endParaRPr lang="es-AR" dirty="0"/>
           </a:p>
@@ -906,7 +923,7 @@
           </a:lstStyle>
           <a:p>
             <a:r>
-              <a:rPr lang="es-ES" smtClean="0"/>
+              <a:rPr lang="es-ES"/>
               <a:t>Haga clic para modificar el estilo de título del patrón</a:t>
             </a:r>
             <a:endParaRPr lang="en-US"/>
@@ -1024,7 +1041,7 @@
           <a:p>
             <a:pPr lvl="0"/>
             <a:r>
-              <a:rPr lang="es-ES" smtClean="0"/>
+              <a:rPr lang="es-ES"/>
               <a:t>Haga clic para modificar el estilo de texto del patrón</a:t>
             </a:r>
           </a:p>
@@ -1047,7 +1064,7 @@
           <a:p>
             <a:fld id="{13FE1CB5-16EE-4C23-BA06-ACFB090D49E9}" type="datetimeFigureOut">
               <a:rPr lang="es-AR" smtClean="0"/>
-              <a:t>19/11/2018</a:t>
+              <a:t>22/11/2018</a:t>
             </a:fld>
             <a:endParaRPr lang="es-AR" dirty="0"/>
           </a:p>
@@ -1137,7 +1154,7 @@
           <a:p>
             <a:fld id="{13FE1CB5-16EE-4C23-BA06-ACFB090D49E9}" type="datetimeFigureOut">
               <a:rPr lang="es-AR" smtClean="0"/>
-              <a:t>19/11/2018</a:t>
+              <a:t>22/11/2018</a:t>
             </a:fld>
             <a:endParaRPr lang="es-AR" dirty="0"/>
           </a:p>
@@ -1206,7 +1223,7 @@
           <a:lstStyle/>
           <a:p>
             <a:r>
-              <a:rPr lang="es-ES" smtClean="0"/>
+              <a:rPr lang="es-ES"/>
               <a:t>Haga clic para modificar el estilo de título del patrón</a:t>
             </a:r>
             <a:endParaRPr lang="en-US"/>
@@ -1235,35 +1252,35 @@
           <a:p>
             <a:pPr lvl="0"/>
             <a:r>
-              <a:rPr lang="es-ES" smtClean="0"/>
+              <a:rPr lang="es-ES"/>
               <a:t>Haga clic para modificar el estilo de texto del patrón</a:t>
             </a:r>
           </a:p>
           <a:p>
             <a:pPr lvl="1"/>
             <a:r>
-              <a:rPr lang="es-ES" smtClean="0"/>
+              <a:rPr lang="es-ES"/>
               <a:t>Segundo nivel</a:t>
             </a:r>
           </a:p>
           <a:p>
             <a:pPr lvl="2"/>
             <a:r>
-              <a:rPr lang="es-ES" smtClean="0"/>
+              <a:rPr lang="es-ES"/>
               <a:t>Tercer nivel</a:t>
             </a:r>
           </a:p>
           <a:p>
             <a:pPr lvl="3"/>
             <a:r>
-              <a:rPr lang="es-ES" smtClean="0"/>
+              <a:rPr lang="es-ES"/>
               <a:t>Cuarto nivel</a:t>
             </a:r>
           </a:p>
           <a:p>
             <a:pPr lvl="4"/>
             <a:r>
-              <a:rPr lang="es-ES" smtClean="0"/>
+              <a:rPr lang="es-ES"/>
               <a:t>Quinto nivel</a:t>
             </a:r>
             <a:endParaRPr lang="en-US"/>
@@ -1292,35 +1309,35 @@
           <a:p>
             <a:pPr lvl="0"/>
             <a:r>
-              <a:rPr lang="es-ES" smtClean="0"/>
+              <a:rPr lang="es-ES"/>
               <a:t>Haga clic para modificar el estilo de texto del patrón</a:t>
             </a:r>
           </a:p>
           <a:p>
             <a:pPr lvl="1"/>
             <a:r>
-              <a:rPr lang="es-ES" smtClean="0"/>
+              <a:rPr lang="es-ES"/>
               <a:t>Segundo nivel</a:t>
             </a:r>
           </a:p>
           <a:p>
             <a:pPr lvl="2"/>
             <a:r>
-              <a:rPr lang="es-ES" smtClean="0"/>
+              <a:rPr lang="es-ES"/>
               <a:t>Tercer nivel</a:t>
             </a:r>
           </a:p>
           <a:p>
             <a:pPr lvl="3"/>
             <a:r>
-              <a:rPr lang="es-ES" smtClean="0"/>
+              <a:rPr lang="es-ES"/>
               <a:t>Cuarto nivel</a:t>
             </a:r>
           </a:p>
           <a:p>
             <a:pPr lvl="4"/>
             <a:r>
-              <a:rPr lang="es-ES" smtClean="0"/>
+              <a:rPr lang="es-ES"/>
               <a:t>Quinto nivel</a:t>
             </a:r>
             <a:endParaRPr lang="en-US"/>
@@ -1417,7 +1434,7 @@
           <a:p>
             <a:pPr lvl="0"/>
             <a:r>
-              <a:rPr lang="es-ES" smtClean="0"/>
+              <a:rPr lang="es-ES"/>
               <a:t>Haga clic para modificar el estilo de texto del patrón</a:t>
             </a:r>
           </a:p>
@@ -1488,7 +1505,7 @@
           <a:p>
             <a:pPr lvl="0"/>
             <a:r>
-              <a:rPr lang="es-ES" smtClean="0"/>
+              <a:rPr lang="es-ES"/>
               <a:t>Haga clic para modificar el estilo de texto del patrón</a:t>
             </a:r>
           </a:p>
@@ -1511,7 +1528,7 @@
           <a:p>
             <a:fld id="{13FE1CB5-16EE-4C23-BA06-ACFB090D49E9}" type="datetimeFigureOut">
               <a:rPr lang="es-AR" smtClean="0"/>
-              <a:t>19/11/2018</a:t>
+              <a:t>22/11/2018</a:t>
             </a:fld>
             <a:endParaRPr lang="es-AR" dirty="0"/>
           </a:p>
@@ -1580,7 +1597,7 @@
           <a:lstStyle/>
           <a:p>
             <a:r>
-              <a:rPr lang="es-ES" smtClean="0"/>
+              <a:rPr lang="es-ES"/>
               <a:t>Haga clic para modificar el estilo de título del patrón</a:t>
             </a:r>
             <a:endParaRPr lang="en-US" dirty="0"/>
@@ -1609,35 +1626,35 @@
           <a:p>
             <a:pPr lvl="0"/>
             <a:r>
-              <a:rPr lang="es-ES" smtClean="0"/>
+              <a:rPr lang="es-ES"/>
               <a:t>Haga clic para modificar el estilo de texto del patrón</a:t>
             </a:r>
           </a:p>
           <a:p>
             <a:pPr lvl="1"/>
             <a:r>
-              <a:rPr lang="es-ES" smtClean="0"/>
+              <a:rPr lang="es-ES"/>
               <a:t>Segundo nivel</a:t>
             </a:r>
           </a:p>
           <a:p>
             <a:pPr lvl="2"/>
             <a:r>
-              <a:rPr lang="es-ES" smtClean="0"/>
+              <a:rPr lang="es-ES"/>
               <a:t>Tercer nivel</a:t>
             </a:r>
           </a:p>
           <a:p>
             <a:pPr lvl="3"/>
             <a:r>
-              <a:rPr lang="es-ES" smtClean="0"/>
+              <a:rPr lang="es-ES"/>
               <a:t>Cuarto nivel</a:t>
             </a:r>
           </a:p>
           <a:p>
             <a:pPr lvl="4"/>
             <a:r>
-              <a:rPr lang="es-ES" smtClean="0"/>
+              <a:rPr lang="es-ES"/>
               <a:t>Quinto nivel</a:t>
             </a:r>
             <a:endParaRPr lang="en-US" dirty="0"/>
@@ -1666,35 +1683,35 @@
           <a:p>
             <a:pPr lvl="0"/>
             <a:r>
-              <a:rPr lang="es-ES" smtClean="0"/>
+              <a:rPr lang="es-ES"/>
               <a:t>Haga clic para modificar el estilo de texto del patrón</a:t>
             </a:r>
           </a:p>
           <a:p>
             <a:pPr lvl="1"/>
             <a:r>
-              <a:rPr lang="es-ES" smtClean="0"/>
+              <a:rPr lang="es-ES"/>
               <a:t>Segundo nivel</a:t>
             </a:r>
           </a:p>
           <a:p>
             <a:pPr lvl="2"/>
             <a:r>
-              <a:rPr lang="es-ES" smtClean="0"/>
+              <a:rPr lang="es-ES"/>
               <a:t>Tercer nivel</a:t>
             </a:r>
           </a:p>
           <a:p>
             <a:pPr lvl="3"/>
             <a:r>
-              <a:rPr lang="es-ES" smtClean="0"/>
+              <a:rPr lang="es-ES"/>
               <a:t>Cuarto nivel</a:t>
             </a:r>
           </a:p>
           <a:p>
             <a:pPr lvl="4"/>
             <a:r>
-              <a:rPr lang="es-ES" smtClean="0"/>
+              <a:rPr lang="es-ES"/>
               <a:t>Quinto nivel</a:t>
             </a:r>
             <a:endParaRPr lang="en-US" dirty="0"/>
@@ -1742,7 +1759,7 @@
           <a:lstStyle/>
           <a:p>
             <a:r>
-              <a:rPr lang="es-ES" smtClean="0"/>
+              <a:rPr lang="es-ES"/>
               <a:t>Haga clic para modificar el estilo de título del patrón</a:t>
             </a:r>
             <a:endParaRPr lang="en-US"/>
@@ -1766,7 +1783,7 @@
           <a:p>
             <a:fld id="{13FE1CB5-16EE-4C23-BA06-ACFB090D49E9}" type="datetimeFigureOut">
               <a:rPr lang="es-AR" smtClean="0"/>
-              <a:t>19/11/2018</a:t>
+              <a:t>22/11/2018</a:t>
             </a:fld>
             <a:endParaRPr lang="es-AR" dirty="0"/>
           </a:p>
@@ -1856,7 +1873,7 @@
           <a:p>
             <a:fld id="{13FE1CB5-16EE-4C23-BA06-ACFB090D49E9}" type="datetimeFigureOut">
               <a:rPr lang="es-AR" smtClean="0"/>
-              <a:t>19/11/2018</a:t>
+              <a:t>22/11/2018</a:t>
             </a:fld>
             <a:endParaRPr lang="es-AR" dirty="0"/>
           </a:p>
@@ -1956,7 +1973,7 @@
           </a:lstStyle>
           <a:p>
             <a:r>
-              <a:rPr lang="es-ES" smtClean="0"/>
+              <a:rPr lang="es-ES"/>
               <a:t>Haga clic para modificar el estilo de título del patrón</a:t>
             </a:r>
             <a:endParaRPr lang="en-US" dirty="0"/>
@@ -2013,35 +2030,35 @@
           <a:p>
             <a:pPr lvl="0"/>
             <a:r>
-              <a:rPr lang="es-ES" smtClean="0"/>
+              <a:rPr lang="es-ES"/>
               <a:t>Haga clic para modificar el estilo de texto del patrón</a:t>
             </a:r>
           </a:p>
           <a:p>
             <a:pPr lvl="1"/>
             <a:r>
-              <a:rPr lang="es-ES" smtClean="0"/>
+              <a:rPr lang="es-ES"/>
               <a:t>Segundo nivel</a:t>
             </a:r>
           </a:p>
           <a:p>
             <a:pPr lvl="2"/>
             <a:r>
-              <a:rPr lang="es-ES" smtClean="0"/>
+              <a:rPr lang="es-ES"/>
               <a:t>Tercer nivel</a:t>
             </a:r>
           </a:p>
           <a:p>
             <a:pPr lvl="3"/>
             <a:r>
-              <a:rPr lang="es-ES" smtClean="0"/>
+              <a:rPr lang="es-ES"/>
               <a:t>Cuarto nivel</a:t>
             </a:r>
           </a:p>
           <a:p>
             <a:pPr lvl="4"/>
             <a:r>
-              <a:rPr lang="es-ES" smtClean="0"/>
+              <a:rPr lang="es-ES"/>
               <a:t>Quinto nivel</a:t>
             </a:r>
             <a:endParaRPr lang="en-US" dirty="0"/>
@@ -2107,7 +2124,7 @@
           <a:p>
             <a:pPr lvl="0"/>
             <a:r>
-              <a:rPr lang="es-ES" smtClean="0"/>
+              <a:rPr lang="es-ES"/>
               <a:t>Haga clic para modificar el estilo de texto del patrón</a:t>
             </a:r>
           </a:p>
@@ -2130,7 +2147,7 @@
           <a:p>
             <a:fld id="{13FE1CB5-16EE-4C23-BA06-ACFB090D49E9}" type="datetimeFigureOut">
               <a:rPr lang="es-AR" smtClean="0"/>
-              <a:t>19/11/2018</a:t>
+              <a:t>22/11/2018</a:t>
             </a:fld>
             <a:endParaRPr lang="es-AR" dirty="0"/>
           </a:p>
@@ -2230,7 +2247,7 @@
           </a:lstStyle>
           <a:p>
             <a:r>
-              <a:rPr lang="es-ES" smtClean="0"/>
+              <a:rPr lang="es-ES"/>
               <a:t>Haga clic para modificar el estilo de título del patrón</a:t>
             </a:r>
             <a:endParaRPr lang="en-US" dirty="0"/>
@@ -2313,7 +2330,7 @@
           </a:lstStyle>
           <a:p>
             <a:r>
-              <a:rPr lang="es-ES" dirty="0" smtClean="0"/>
+              <a:rPr lang="es-ES" dirty="0"/>
               <a:t>Haga clic en el icono para agregar una imagen</a:t>
             </a:r>
             <a:endParaRPr lang="en-US" dirty="0"/>
@@ -2379,7 +2396,7 @@
           <a:p>
             <a:pPr lvl="0"/>
             <a:r>
-              <a:rPr lang="es-ES" smtClean="0"/>
+              <a:rPr lang="es-ES"/>
               <a:t>Haga clic para modificar el estilo de texto del patrón</a:t>
             </a:r>
           </a:p>
@@ -2402,7 +2419,7 @@
           <a:p>
             <a:fld id="{13FE1CB5-16EE-4C23-BA06-ACFB090D49E9}" type="datetimeFigureOut">
               <a:rPr lang="es-AR" smtClean="0"/>
-              <a:t>19/11/2018</a:t>
+              <a:t>22/11/2018</a:t>
             </a:fld>
             <a:endParaRPr lang="es-AR" dirty="0"/>
           </a:p>
@@ -2598,7 +2615,7 @@
           <a:lstStyle/>
           <a:p>
             <a:r>
-              <a:rPr lang="es-ES" smtClean="0"/>
+              <a:rPr lang="es-ES"/>
               <a:t>Haga clic para modificar el estilo de título del patrón</a:t>
             </a:r>
             <a:endParaRPr lang="en-US" dirty="0"/>
@@ -2632,38 +2649,38 @@
           <a:p>
             <a:pPr lvl="0"/>
             <a:r>
-              <a:rPr lang="es-ES" smtClean="0"/>
+              <a:rPr lang="es-ES"/>
               <a:t>Haga clic para modificar el estilo de texto del patrón</a:t>
             </a:r>
           </a:p>
           <a:p>
             <a:pPr lvl="1"/>
             <a:r>
-              <a:rPr lang="es-ES" smtClean="0"/>
+              <a:rPr lang="es-ES"/>
               <a:t>Segundo nivel</a:t>
             </a:r>
           </a:p>
           <a:p>
             <a:pPr lvl="2"/>
             <a:r>
-              <a:rPr lang="es-ES" smtClean="0"/>
+              <a:rPr lang="es-ES"/>
               <a:t>Tercer nivel</a:t>
             </a:r>
           </a:p>
           <a:p>
             <a:pPr lvl="3"/>
             <a:r>
-              <a:rPr lang="es-ES" smtClean="0"/>
+              <a:rPr lang="es-ES"/>
               <a:t>Cuarto nivel</a:t>
             </a:r>
           </a:p>
           <a:p>
             <a:pPr lvl="4"/>
             <a:r>
-              <a:rPr lang="es-ES" smtClean="0"/>
+              <a:rPr lang="es-ES"/>
               <a:t>Quinto nivel</a:t>
             </a:r>
-            <a:endParaRPr lang="en-US" dirty="0" smtClean="0"/>
+            <a:endParaRPr lang="en-US" dirty="0"/>
           </a:p>
         </p:txBody>
       </p:sp>
@@ -2702,7 +2719,7 @@
           <a:p>
             <a:fld id="{13FE1CB5-16EE-4C23-BA06-ACFB090D49E9}" type="datetimeFigureOut">
               <a:rPr lang="es-AR" smtClean="0"/>
-              <a:t>19/11/2018</a:t>
+              <a:t>22/11/2018</a:t>
             </a:fld>
             <a:endParaRPr lang="es-AR" dirty="0"/>
           </a:p>
@@ -3173,26 +3190,26 @@
           <a:p>
             <a:pPr algn="ctr"/>
             <a:r>
-              <a:rPr lang="en-US" dirty="0" err="1" smtClean="0"/>
+              <a:rPr lang="en-US" dirty="0" err="1"/>
               <a:t>Trabajo</a:t>
             </a:r>
             <a:r>
-              <a:rPr lang="en-US" dirty="0" smtClean="0"/>
+              <a:rPr lang="en-US" dirty="0"/>
               <a:t> </a:t>
             </a:r>
             <a:r>
-              <a:rPr lang="en-US" dirty="0" err="1" smtClean="0"/>
+              <a:rPr lang="en-US" dirty="0" err="1"/>
               <a:t>practico</a:t>
             </a:r>
             <a:r>
-              <a:rPr lang="en-US" dirty="0" smtClean="0"/>
+              <a:rPr lang="en-US" dirty="0"/>
               <a:t> Final</a:t>
             </a:r>
             <a:br>
-              <a:rPr lang="en-US" dirty="0" smtClean="0"/>
+              <a:rPr lang="en-US" dirty="0"/>
             </a:br>
             <a:r>
-              <a:rPr lang="en-US" dirty="0" smtClean="0"/>
+              <a:rPr lang="en-US" dirty="0"/>
               <a:t>Electronica 3</a:t>
             </a:r>
             <a:endParaRPr lang="es-AR" dirty="0"/>
@@ -3222,11 +3239,11 @@
           <a:lstStyle/>
           <a:p>
             <a:r>
-              <a:rPr lang="en-US" dirty="0" err="1" smtClean="0"/>
+              <a:rPr lang="en-US" dirty="0" err="1"/>
               <a:t>Autores</a:t>
             </a:r>
             <a:r>
-              <a:rPr lang="en-US" dirty="0" smtClean="0"/>
+              <a:rPr lang="en-US" dirty="0"/>
               <a:t>:</a:t>
             </a:r>
           </a:p>
@@ -3236,7 +3253,7 @@
               <a:buChar char="•"/>
             </a:pPr>
             <a:r>
-              <a:rPr lang="en-US" dirty="0" smtClean="0"/>
+              <a:rPr lang="en-US" dirty="0"/>
               <a:t>Lucero Guadalupe Fernandez</a:t>
             </a:r>
           </a:p>
@@ -3246,18 +3263,18 @@
               <a:buChar char="•"/>
             </a:pPr>
             <a:r>
-              <a:rPr lang="en-US" dirty="0" err="1" smtClean="0"/>
+              <a:rPr lang="en-US" dirty="0" err="1"/>
               <a:t>Matias</a:t>
             </a:r>
             <a:r>
-              <a:rPr lang="en-US" dirty="0" smtClean="0"/>
+              <a:rPr lang="en-US" dirty="0"/>
               <a:t> </a:t>
             </a:r>
             <a:r>
-              <a:rPr lang="en-US" dirty="0" err="1" smtClean="0"/>
+              <a:rPr lang="en-US" dirty="0" err="1"/>
               <a:t>Larroque</a:t>
             </a:r>
-            <a:endParaRPr lang="en-US" dirty="0" smtClean="0"/>
+            <a:endParaRPr lang="en-US" dirty="0"/>
           </a:p>
           <a:p>
             <a:pPr marL="342900" indent="-342900">
@@ -3265,14 +3282,14 @@
               <a:buChar char="•"/>
             </a:pPr>
             <a:r>
-              <a:rPr lang="en-US" dirty="0" smtClean="0"/>
+              <a:rPr lang="en-US" dirty="0"/>
               <a:t>Manuel </a:t>
             </a:r>
             <a:r>
-              <a:rPr lang="en-US" dirty="0" err="1" smtClean="0"/>
+              <a:rPr lang="en-US" dirty="0" err="1"/>
               <a:t>Mollon</a:t>
             </a:r>
-            <a:endParaRPr lang="en-US" dirty="0" smtClean="0"/>
+            <a:endParaRPr lang="en-US" dirty="0"/>
           </a:p>
           <a:p>
             <a:pPr marL="342900" indent="-342900">
@@ -3280,11 +3297,11 @@
               <a:buChar char="•"/>
             </a:pPr>
             <a:r>
-              <a:rPr lang="en-US" dirty="0" err="1" smtClean="0"/>
+              <a:rPr lang="en-US" dirty="0" err="1"/>
               <a:t>Ezequiel</a:t>
             </a:r>
             <a:r>
-              <a:rPr lang="en-US" dirty="0" smtClean="0"/>
+              <a:rPr lang="en-US" dirty="0"/>
               <a:t> Vijande</a:t>
             </a:r>
             <a:endParaRPr lang="es-AR" dirty="0"/>
@@ -3374,6 +3391,86 @@
     </p:spTree>
     <p:extLst>
       <p:ext uri="{BB962C8B-B14F-4D97-AF65-F5344CB8AC3E}">
+        <p14:creationId xmlns:p14="http://schemas.microsoft.com/office/powerpoint/2010/main" val="1635586395"/>
+      </p:ext>
+    </p:extLst>
+  </p:cSld>
+  <p:clrMapOvr>
+    <a:masterClrMapping/>
+  </p:clrMapOvr>
+</p:sld>
+</file>
+
+<file path=ppt/slides/slide11.xml><?xml version="1.0" encoding="utf-8"?>
+<p:sld xmlns:a="http://schemas.openxmlformats.org/drawingml/2006/main" xmlns:r="http://schemas.openxmlformats.org/officeDocument/2006/relationships" xmlns:p="http://schemas.openxmlformats.org/presentationml/2006/main">
+  <p:cSld>
+    <p:spTree>
+      <p:nvGrpSpPr>
+        <p:cNvPr id="1" name=""/>
+        <p:cNvGrpSpPr/>
+        <p:nvPr/>
+      </p:nvGrpSpPr>
+      <p:grpSpPr>
+        <a:xfrm>
+          <a:off x="0" y="0"/>
+          <a:ext cx="0" cy="0"/>
+          <a:chOff x="0" y="0"/>
+          <a:chExt cx="0" cy="0"/>
+        </a:xfrm>
+      </p:grpSpPr>
+      <p:sp>
+        <p:nvSpPr>
+          <p:cNvPr id="2" name="1 Título"/>
+          <p:cNvSpPr>
+            <a:spLocks noGrp="1"/>
+          </p:cNvSpPr>
+          <p:nvPr>
+            <p:ph type="title"/>
+          </p:nvPr>
+        </p:nvSpPr>
+        <p:spPr/>
+        <p:txBody>
+          <a:bodyPr/>
+          <a:lstStyle/>
+          <a:p>
+            <a:endParaRPr lang="es-AR" dirty="0"/>
+          </a:p>
+        </p:txBody>
+      </p:sp>
+      <p:sp>
+        <p:nvSpPr>
+          <p:cNvPr id="3" name="2 Marcador de posición de imagen"/>
+          <p:cNvSpPr>
+            <a:spLocks noGrp="1"/>
+          </p:cNvSpPr>
+          <p:nvPr>
+            <p:ph type="pic" idx="1"/>
+          </p:nvPr>
+        </p:nvSpPr>
+        <p:spPr/>
+      </p:sp>
+      <p:sp>
+        <p:nvSpPr>
+          <p:cNvPr id="4" name="3 Marcador de texto"/>
+          <p:cNvSpPr>
+            <a:spLocks noGrp="1"/>
+          </p:cNvSpPr>
+          <p:nvPr>
+            <p:ph type="body" sz="half" idx="2"/>
+          </p:nvPr>
+        </p:nvSpPr>
+        <p:spPr/>
+        <p:txBody>
+          <a:bodyPr/>
+          <a:lstStyle/>
+          <a:p>
+            <a:endParaRPr lang="es-AR" dirty="0"/>
+          </a:p>
+        </p:txBody>
+      </p:sp>
+    </p:spTree>
+    <p:extLst>
+      <p:ext uri="{BB962C8B-B14F-4D97-AF65-F5344CB8AC3E}">
         <p14:creationId xmlns:p14="http://schemas.microsoft.com/office/powerpoint/2010/main" val="1090543252"/>
       </p:ext>
     </p:extLst>
@@ -3417,15 +3514,15 @@
           <a:lstStyle/>
           <a:p>
             <a:r>
-              <a:rPr lang="es-AR" dirty="0" smtClean="0"/>
+              <a:rPr lang="es-AR" dirty="0"/>
               <a:t>Objetivos</a:t>
             </a:r>
             <a:r>
-              <a:rPr lang="en-US" dirty="0" smtClean="0"/>
+              <a:rPr lang="en-US" dirty="0"/>
               <a:t> y </a:t>
             </a:r>
             <a:r>
-              <a:rPr lang="en-US" dirty="0" err="1" smtClean="0"/>
+              <a:rPr lang="en-US" dirty="0" err="1"/>
               <a:t>resumen</a:t>
             </a:r>
             <a:endParaRPr lang="es-AR" dirty="0"/>
@@ -3448,162 +3545,158 @@
           <a:lstStyle/>
           <a:p>
             <a:r>
-              <a:rPr lang="en-US" dirty="0" err="1" smtClean="0"/>
+              <a:rPr lang="en-US" dirty="0" err="1"/>
               <a:t>Visualizar</a:t>
+            </a:r>
+            <a:r>
+              <a:rPr lang="en-US" dirty="0"/>
+              <a:t> un </a:t>
+            </a:r>
+            <a:r>
+              <a:rPr lang="es-AR" dirty="0"/>
+              <a:t>cronometro</a:t>
+            </a:r>
+            <a:r>
+              <a:rPr lang="en-US" dirty="0"/>
+              <a:t> en un monitor VGA </a:t>
+            </a:r>
+            <a:r>
+              <a:rPr lang="en-US" dirty="0" err="1"/>
+              <a:t>utilizando</a:t>
             </a:r>
             <a:r>
               <a:rPr lang="en-US" dirty="0"/>
               <a:t> </a:t>
             </a:r>
             <a:r>
-              <a:rPr lang="en-US" dirty="0" smtClean="0"/>
-              <a:t>un </a:t>
-            </a:r>
-            <a:r>
-              <a:rPr lang="es-AR" dirty="0" smtClean="0"/>
-              <a:t>cronometro</a:t>
-            </a:r>
-            <a:r>
-              <a:rPr lang="en-US" dirty="0" smtClean="0"/>
-              <a:t> en un monitor VGA </a:t>
-            </a:r>
-            <a:r>
-              <a:rPr lang="en-US" dirty="0" err="1" smtClean="0"/>
-              <a:t>utilizando</a:t>
-            </a:r>
-            <a:r>
-              <a:rPr lang="en-US" dirty="0" smtClean="0"/>
+              <a:rPr lang="en-US" dirty="0" err="1"/>
+              <a:t>una</a:t>
+            </a:r>
+            <a:r>
+              <a:rPr lang="en-US" dirty="0"/>
               <a:t> </a:t>
             </a:r>
             <a:r>
-              <a:rPr lang="en-US" dirty="0" err="1" smtClean="0"/>
-              <a:t>una</a:t>
-            </a:r>
-            <a:r>
-              <a:rPr lang="en-US" dirty="0" smtClean="0"/>
+              <a:rPr lang="en-US" dirty="0" err="1"/>
+              <a:t>Fpga</a:t>
+            </a:r>
+            <a:r>
+              <a:rPr lang="en-US" dirty="0"/>
+              <a:t>.</a:t>
+            </a:r>
+          </a:p>
+          <a:p>
+            <a:pPr marL="45720" indent="0">
+              <a:buNone/>
+            </a:pPr>
+            <a:endParaRPr lang="en-US" dirty="0"/>
+          </a:p>
+          <a:p>
+            <a:r>
+              <a:rPr lang="en-US" dirty="0" err="1"/>
+              <a:t>Modularizar</a:t>
+            </a:r>
+            <a:r>
+              <a:rPr lang="en-US" dirty="0"/>
+              <a:t> el </a:t>
+            </a:r>
+            <a:r>
+              <a:rPr lang="en-US" dirty="0" err="1"/>
+              <a:t>proyecto</a:t>
+            </a:r>
+            <a:r>
+              <a:rPr lang="en-US" dirty="0"/>
+              <a:t> en la mayor </a:t>
+            </a:r>
+            <a:r>
+              <a:rPr lang="en-US" dirty="0" err="1"/>
+              <a:t>medida</a:t>
+            </a:r>
+            <a:r>
+              <a:rPr lang="en-US" dirty="0"/>
               <a:t> </a:t>
             </a:r>
             <a:r>
-              <a:rPr lang="en-US" dirty="0" err="1" smtClean="0"/>
-              <a:t>Fpga</a:t>
-            </a:r>
-            <a:r>
-              <a:rPr lang="en-US" dirty="0" smtClean="0"/>
+              <a:rPr lang="en-US" dirty="0" err="1"/>
+              <a:t>posible</a:t>
+            </a:r>
+            <a:r>
+              <a:rPr lang="en-US" dirty="0"/>
               <a:t>.</a:t>
             </a:r>
           </a:p>
           <a:p>
-            <a:pPr marL="45720" indent="0">
-              <a:buNone/>
-            </a:pPr>
-            <a:endParaRPr lang="en-US" dirty="0" smtClean="0"/>
-          </a:p>
-          <a:p>
-            <a:r>
-              <a:rPr lang="en-US" dirty="0" err="1" smtClean="0"/>
-              <a:t>Modularizar</a:t>
-            </a:r>
-            <a:r>
-              <a:rPr lang="en-US" dirty="0" smtClean="0"/>
+            <a:endParaRPr lang="en-US" dirty="0"/>
+          </a:p>
+          <a:p>
+            <a:r>
+              <a:rPr lang="en-US" dirty="0"/>
+              <a:t>Se </a:t>
+            </a:r>
+            <a:r>
+              <a:rPr lang="en-US" dirty="0" err="1"/>
+              <a:t>realizaron</a:t>
+            </a:r>
+            <a:r>
+              <a:rPr lang="en-US" dirty="0"/>
+              <a:t> los </a:t>
+            </a:r>
+            <a:r>
+              <a:rPr lang="en-US" dirty="0" err="1"/>
+              <a:t>modulos</a:t>
+            </a:r>
+            <a:r>
+              <a:rPr lang="en-US" dirty="0"/>
+              <a:t> en Verilog y se </a:t>
+            </a:r>
+            <a:r>
+              <a:rPr lang="en-US" dirty="0" err="1"/>
+              <a:t>simularon</a:t>
+            </a:r>
+            <a:r>
+              <a:rPr lang="en-US" dirty="0"/>
+              <a:t> con </a:t>
+            </a:r>
+            <a:r>
+              <a:rPr lang="en-US" dirty="0" err="1"/>
+              <a:t>GTKWave</a:t>
+            </a:r>
+            <a:r>
+              <a:rPr lang="en-US" dirty="0"/>
+              <a:t>.</a:t>
+            </a:r>
+          </a:p>
+          <a:p>
+            <a:endParaRPr lang="en-US" dirty="0"/>
+          </a:p>
+          <a:p>
+            <a:r>
+              <a:rPr lang="en-US" dirty="0" err="1"/>
+              <a:t>Implementar</a:t>
+            </a:r>
+            <a:r>
+              <a:rPr lang="en-US" dirty="0"/>
               <a:t> el </a:t>
             </a:r>
             <a:r>
-              <a:rPr lang="en-US" dirty="0" err="1" smtClean="0"/>
+              <a:rPr lang="en-US" dirty="0" err="1"/>
               <a:t>proyecto</a:t>
             </a:r>
             <a:r>
-              <a:rPr lang="en-US" dirty="0" smtClean="0"/>
-              <a:t> en la mayor </a:t>
-            </a:r>
-            <a:r>
-              <a:rPr lang="en-US" dirty="0" err="1" smtClean="0"/>
-              <a:t>medida</a:t>
-            </a:r>
-            <a:r>
-              <a:rPr lang="en-US" dirty="0" smtClean="0"/>
-              <a:t> </a:t>
-            </a:r>
-            <a:r>
-              <a:rPr lang="en-US" dirty="0" err="1" smtClean="0"/>
-              <a:t>posible</a:t>
-            </a:r>
-            <a:r>
-              <a:rPr lang="en-US" dirty="0" smtClean="0"/>
+              <a:rPr lang="en-US" dirty="0"/>
+              <a:t> en </a:t>
+            </a:r>
+            <a:r>
+              <a:rPr lang="en-US" dirty="0" err="1"/>
+              <a:t>Quartus</a:t>
+            </a:r>
+            <a:r>
+              <a:rPr lang="en-US" dirty="0"/>
               <a:t>.</a:t>
             </a:r>
           </a:p>
           <a:p>
-            <a:endParaRPr lang="en-US" dirty="0" smtClean="0"/>
-          </a:p>
-          <a:p>
-            <a:r>
-              <a:rPr lang="en-US" dirty="0" smtClean="0"/>
-              <a:t>Se </a:t>
-            </a:r>
-            <a:r>
-              <a:rPr lang="en-US" dirty="0" err="1" smtClean="0"/>
-              <a:t>realizaron</a:t>
-            </a:r>
-            <a:r>
-              <a:rPr lang="en-US" dirty="0" smtClean="0"/>
-              <a:t> los </a:t>
-            </a:r>
-            <a:r>
-              <a:rPr lang="en-US" dirty="0" err="1" smtClean="0"/>
-              <a:t>modulos</a:t>
-            </a:r>
-            <a:r>
-              <a:rPr lang="en-US" dirty="0" smtClean="0"/>
-              <a:t> en Verilog y se </a:t>
-            </a:r>
-            <a:r>
-              <a:rPr lang="en-US" dirty="0" err="1" smtClean="0"/>
-              <a:t>simularon</a:t>
-            </a:r>
-            <a:r>
-              <a:rPr lang="en-US" dirty="0" smtClean="0"/>
-              <a:t> con </a:t>
-            </a:r>
-            <a:r>
-              <a:rPr lang="en-US" dirty="0" err="1" smtClean="0"/>
-              <a:t>GTKWave</a:t>
-            </a:r>
-            <a:r>
-              <a:rPr lang="en-US" dirty="0" smtClean="0"/>
-              <a:t>.</a:t>
-            </a:r>
-          </a:p>
-          <a:p>
-            <a:endParaRPr lang="en-US" dirty="0" smtClean="0"/>
-          </a:p>
-          <a:p>
-            <a:r>
-              <a:rPr lang="en-US" dirty="0" err="1" smtClean="0"/>
-              <a:t>Implementar</a:t>
-            </a:r>
-            <a:r>
-              <a:rPr lang="en-US" dirty="0" smtClean="0"/>
-              <a:t> el </a:t>
-            </a:r>
-            <a:r>
-              <a:rPr lang="en-US" dirty="0" err="1" smtClean="0"/>
-              <a:t>proyecto</a:t>
-            </a:r>
-            <a:r>
-              <a:rPr lang="en-US" dirty="0" smtClean="0"/>
-              <a:t> en </a:t>
-            </a:r>
-            <a:r>
-              <a:rPr lang="en-US" dirty="0" err="1" smtClean="0"/>
-              <a:t>Quartus</a:t>
-            </a:r>
-            <a:r>
-              <a:rPr lang="en-US" dirty="0" smtClean="0"/>
-              <a:t>.</a:t>
-            </a:r>
-          </a:p>
-          <a:p>
-            <a:endParaRPr lang="en-US" dirty="0" smtClean="0"/>
+            <a:endParaRPr lang="en-US" dirty="0"/>
           </a:p>
           <a:p>
             <a:endParaRPr lang="es-AR" dirty="0"/>
@@ -3652,7 +3745,7 @@
         </p:nvSpPr>
         <p:spPr>
           <a:xfrm>
-            <a:off x="1066800" y="914400"/>
+            <a:off x="1015782" y="152400"/>
             <a:ext cx="7315200" cy="1154097"/>
           </a:xfrm>
         </p:spPr>
@@ -3662,7 +3755,7 @@
           <a:p>
             <a:pPr algn="ctr"/>
             <a:r>
-              <a:rPr lang="en-US" dirty="0" smtClean="0"/>
+              <a:rPr lang="en-US" dirty="0"/>
               <a:t>DE0-NANO</a:t>
             </a:r>
             <a:endParaRPr lang="es-AR" dirty="0"/>
@@ -3693,7 +3786,7 @@
         </p:blipFill>
         <p:spPr>
           <a:xfrm>
-            <a:off x="2057400" y="2362200"/>
+            <a:off x="2057400" y="1981200"/>
             <a:ext cx="5231964" cy="4095610"/>
           </a:xfrm>
         </p:spPr>
@@ -3730,7 +3823,13 @@
       </p:grpSpPr>
       <p:sp>
         <p:nvSpPr>
-          <p:cNvPr id="2" name="1 Título"/>
+          <p:cNvPr id="7" name="Título 6">
+            <a:extLst>
+              <a:ext uri="{FF2B5EF4-FFF2-40B4-BE49-F238E27FC236}">
+                <a16:creationId xmlns:a16="http://schemas.microsoft.com/office/drawing/2014/main" id="{1D5E65A3-AB87-4406-8B49-DAEDD1CBE0D3}"/>
+              </a:ext>
+            </a:extLst>
+          </p:cNvPr>
           <p:cNvSpPr>
             <a:spLocks noGrp="1"/>
           </p:cNvSpPr>
@@ -3738,50 +3837,67 @@
             <p:ph type="title"/>
           </p:nvPr>
         </p:nvSpPr>
-        <p:spPr/>
-        <p:txBody>
-          <a:bodyPr/>
-          <a:lstStyle/>
-          <a:p>
-            <a:endParaRPr lang="es-AR" dirty="0"/>
-          </a:p>
-        </p:txBody>
-      </p:sp>
-      <p:sp>
-        <p:nvSpPr>
-          <p:cNvPr id="3" name="2 Marcador de posición de imagen"/>
-          <p:cNvSpPr>
-            <a:spLocks noGrp="1"/>
-          </p:cNvSpPr>
-          <p:nvPr>
-            <p:ph type="pic" idx="1"/>
-          </p:nvPr>
-        </p:nvSpPr>
-        <p:spPr/>
-      </p:sp>
-      <p:sp>
-        <p:nvSpPr>
-          <p:cNvPr id="4" name="3 Marcador de texto"/>
-          <p:cNvSpPr>
-            <a:spLocks noGrp="1"/>
-          </p:cNvSpPr>
-          <p:nvPr>
-            <p:ph type="body" sz="half" idx="2"/>
-          </p:nvPr>
-        </p:nvSpPr>
-        <p:spPr/>
-        <p:txBody>
-          <a:bodyPr/>
-          <a:lstStyle/>
-          <a:p>
-            <a:endParaRPr lang="es-AR" dirty="0"/>
-          </a:p>
-        </p:txBody>
-      </p:sp>
+        <p:spPr>
+          <a:xfrm>
+            <a:off x="917917" y="457200"/>
+            <a:ext cx="7315200" cy="812955"/>
+          </a:xfrm>
+        </p:spPr>
+        <p:txBody>
+          <a:bodyPr/>
+          <a:lstStyle/>
+          <a:p>
+            <a:pPr algn="ctr"/>
+            <a:r>
+              <a:rPr lang="en-US" dirty="0" err="1"/>
+              <a:t>Protocolo</a:t>
+            </a:r>
+            <a:r>
+              <a:rPr lang="en-US" dirty="0"/>
+              <a:t> VGA</a:t>
+            </a:r>
+          </a:p>
+        </p:txBody>
+      </p:sp>
+      <p:pic>
+        <p:nvPicPr>
+          <p:cNvPr id="10" name="Marcador de contenido 9">
+            <a:extLst>
+              <a:ext uri="{FF2B5EF4-FFF2-40B4-BE49-F238E27FC236}">
+                <a16:creationId xmlns:a16="http://schemas.microsoft.com/office/drawing/2014/main" id="{3399CDEC-1073-4441-88AE-E289D871D962}"/>
+              </a:ext>
+            </a:extLst>
+          </p:cNvPr>
+          <p:cNvPicPr>
+            <a:picLocks noGrp="1" noChangeAspect="1"/>
+          </p:cNvPicPr>
+          <p:nvPr>
+            <p:ph idx="1"/>
+          </p:nvPr>
+        </p:nvPicPr>
+        <p:blipFill>
+          <a:blip r:embed="rId2">
+            <a:extLst>
+              <a:ext uri="{28A0092B-C50C-407E-A947-70E740481C1C}">
+                <a14:useLocalDpi xmlns:a14="http://schemas.microsoft.com/office/drawing/2010/main" val="0"/>
+              </a:ext>
+            </a:extLst>
+          </a:blip>
+          <a:stretch>
+            <a:fillRect/>
+          </a:stretch>
+        </p:blipFill>
+        <p:spPr>
+          <a:xfrm>
+            <a:off x="1397104" y="1727355"/>
+            <a:ext cx="6832496" cy="4876800"/>
+          </a:xfrm>
+        </p:spPr>
+      </p:pic>
     </p:spTree>
     <p:extLst>
       <p:ext uri="{BB962C8B-B14F-4D97-AF65-F5344CB8AC3E}">
-        <p14:creationId xmlns:p14="http://schemas.microsoft.com/office/powerpoint/2010/main" val="629562670"/>
+        <p14:creationId xmlns:p14="http://schemas.microsoft.com/office/powerpoint/2010/main" val="3058158718"/>
       </p:ext>
     </p:extLst>
   </p:cSld>
@@ -3818,30 +3934,68 @@
             <p:ph type="title"/>
           </p:nvPr>
         </p:nvSpPr>
-        <p:spPr/>
-        <p:txBody>
-          <a:bodyPr/>
-          <a:lstStyle/>
-          <a:p>
-            <a:endParaRPr lang="es-AR" dirty="0"/>
-          </a:p>
-        </p:txBody>
-      </p:sp>
-      <p:sp>
-        <p:nvSpPr>
-          <p:cNvPr id="3" name="2 Marcador de posición de imagen"/>
-          <p:cNvSpPr>
-            <a:spLocks noGrp="1"/>
-          </p:cNvSpPr>
-          <p:nvPr>
-            <p:ph type="pic" idx="1"/>
-          </p:nvPr>
-        </p:nvSpPr>
-        <p:spPr/>
-      </p:sp>
-      <p:sp>
-        <p:nvSpPr>
-          <p:cNvPr id="4" name="3 Marcador de texto"/>
+        <p:spPr>
+          <a:xfrm>
+            <a:off x="533400" y="694261"/>
+            <a:ext cx="3331936" cy="1066800"/>
+          </a:xfrm>
+        </p:spPr>
+        <p:txBody>
+          <a:bodyPr/>
+          <a:lstStyle/>
+          <a:p>
+            <a:pPr algn="ctr"/>
+            <a:r>
+              <a:rPr lang="es-AR" dirty="0"/>
+              <a:t>Esquema del sistema</a:t>
+            </a:r>
+          </a:p>
+        </p:txBody>
+      </p:sp>
+      <p:pic>
+        <p:nvPicPr>
+          <p:cNvPr id="8" name="Marcador de contenido 7">
+            <a:extLst>
+              <a:ext uri="{FF2B5EF4-FFF2-40B4-BE49-F238E27FC236}">
+                <a16:creationId xmlns:a16="http://schemas.microsoft.com/office/drawing/2014/main" id="{47F9B79E-BDE2-4FCA-881F-88FB35818ABE}"/>
+              </a:ext>
+            </a:extLst>
+          </p:cNvPr>
+          <p:cNvPicPr>
+            <a:picLocks noGrp="1" noChangeAspect="1"/>
+          </p:cNvPicPr>
+          <p:nvPr>
+            <p:ph idx="1"/>
+          </p:nvPr>
+        </p:nvPicPr>
+        <p:blipFill>
+          <a:blip r:embed="rId2">
+            <a:extLst>
+              <a:ext uri="{28A0092B-C50C-407E-A947-70E740481C1C}">
+                <a14:useLocalDpi xmlns:a14="http://schemas.microsoft.com/office/drawing/2010/main" val="0"/>
+              </a:ext>
+            </a:extLst>
+          </a:blip>
+          <a:stretch>
+            <a:fillRect/>
+          </a:stretch>
+        </p:blipFill>
+        <p:spPr>
+          <a:xfrm>
+            <a:off x="4021138" y="3028721"/>
+            <a:ext cx="4208462" cy="2073734"/>
+          </a:xfrm>
+        </p:spPr>
+      </p:pic>
+      <p:sp>
+        <p:nvSpPr>
+          <p:cNvPr id="6" name="Marcador de texto 5">
+            <a:extLst>
+              <a:ext uri="{FF2B5EF4-FFF2-40B4-BE49-F238E27FC236}">
+                <a16:creationId xmlns:a16="http://schemas.microsoft.com/office/drawing/2014/main" id="{0655177A-D776-484A-9CA6-DE98F5426F90}"/>
+              </a:ext>
+            </a:extLst>
+          </p:cNvPr>
           <p:cNvSpPr>
             <a:spLocks noGrp="1"/>
           </p:cNvSpPr>
@@ -3849,19 +4003,200 @@
             <p:ph type="body" sz="half" idx="2"/>
           </p:nvPr>
         </p:nvSpPr>
-        <p:spPr/>
-        <p:txBody>
-          <a:bodyPr/>
-          <a:lstStyle/>
-          <a:p>
-            <a:endParaRPr lang="es-AR" dirty="0"/>
+        <p:spPr>
+          <a:xfrm>
+            <a:off x="228600" y="1981200"/>
+            <a:ext cx="3636736" cy="4325283"/>
+          </a:xfrm>
+        </p:spPr>
+        <p:txBody>
+          <a:bodyPr>
+            <a:normAutofit/>
+          </a:bodyPr>
+          <a:lstStyle/>
+          <a:p>
+            <a:pPr marL="285750" indent="-285750">
+              <a:buFont typeface="Arial" panose="020B0604020202020204" pitchFamily="34" charset="0"/>
+              <a:buChar char="•"/>
+            </a:pPr>
+            <a:r>
+              <a:rPr lang="en-US" sz="1800" dirty="0"/>
+              <a:t>Contador de </a:t>
+            </a:r>
+            <a:r>
+              <a:rPr lang="en-US" sz="1800" dirty="0" err="1"/>
+              <a:t>pulsos</a:t>
+            </a:r>
+            <a:r>
+              <a:rPr lang="en-US" sz="1800" dirty="0"/>
+              <a:t> que  </a:t>
+            </a:r>
+            <a:r>
+              <a:rPr lang="en-US" sz="1800" dirty="0" err="1"/>
+              <a:t>actualiza</a:t>
+            </a:r>
+            <a:r>
+              <a:rPr lang="en-US" sz="1800" dirty="0"/>
+              <a:t> el </a:t>
+            </a:r>
+            <a:r>
+              <a:rPr lang="en-US" sz="1800" dirty="0" err="1"/>
+              <a:t>reloj</a:t>
+            </a:r>
+            <a:r>
+              <a:rPr lang="en-US" sz="1800" dirty="0"/>
+              <a:t> del </a:t>
+            </a:r>
+            <a:r>
+              <a:rPr lang="en-US" sz="1800" dirty="0" err="1"/>
+              <a:t>cronometro</a:t>
+            </a:r>
+            <a:r>
+              <a:rPr lang="en-US" sz="1800" dirty="0"/>
+              <a:t>.</a:t>
+            </a:r>
+          </a:p>
+          <a:p>
+            <a:pPr marL="285750" indent="-285750">
+              <a:buFont typeface="Arial" panose="020B0604020202020204" pitchFamily="34" charset="0"/>
+              <a:buChar char="•"/>
+            </a:pPr>
+            <a:endParaRPr lang="en-US" sz="1800" dirty="0"/>
+          </a:p>
+          <a:p>
+            <a:pPr marL="285750" indent="-285750">
+              <a:buFont typeface="Arial" panose="020B0604020202020204" pitchFamily="34" charset="0"/>
+              <a:buChar char="•"/>
+            </a:pPr>
+            <a:r>
+              <a:rPr lang="en-US" sz="1800" dirty="0" err="1"/>
+              <a:t>Controlador</a:t>
+            </a:r>
+            <a:r>
+              <a:rPr lang="en-US" sz="1800" dirty="0"/>
+              <a:t> del </a:t>
+            </a:r>
+            <a:r>
+              <a:rPr lang="en-US" sz="1800" dirty="0" err="1"/>
+              <a:t>protocolo</a:t>
+            </a:r>
+            <a:r>
+              <a:rPr lang="en-US" sz="1800" dirty="0"/>
+              <a:t> VGA, decide </a:t>
+            </a:r>
+            <a:r>
+              <a:rPr lang="en-US" sz="1800" dirty="0" err="1"/>
+              <a:t>cuando</a:t>
+            </a:r>
+            <a:r>
+              <a:rPr lang="en-US" sz="1800" dirty="0"/>
+              <a:t> debe </a:t>
+            </a:r>
+            <a:r>
+              <a:rPr lang="en-US" sz="1800" dirty="0" err="1"/>
+              <a:t>dibujarse</a:t>
+            </a:r>
+            <a:r>
+              <a:rPr lang="en-US" sz="1800" dirty="0"/>
+              <a:t> </a:t>
+            </a:r>
+            <a:r>
+              <a:rPr lang="en-US" sz="1800" dirty="0" err="1"/>
+              <a:t>en</a:t>
+            </a:r>
+            <a:r>
+              <a:rPr lang="en-US" sz="1800" dirty="0"/>
+              <a:t> el monitor y </a:t>
+            </a:r>
+            <a:r>
+              <a:rPr lang="en-US" sz="1800" dirty="0" err="1"/>
+              <a:t>en</a:t>
+            </a:r>
+            <a:r>
+              <a:rPr lang="en-US" sz="1800" dirty="0"/>
+              <a:t> que sector de la </a:t>
+            </a:r>
+            <a:r>
+              <a:rPr lang="en-US" sz="1800" dirty="0" err="1"/>
+              <a:t>misma</a:t>
+            </a:r>
+            <a:r>
+              <a:rPr lang="en-US" sz="1800" dirty="0"/>
+              <a:t>.</a:t>
+            </a:r>
+          </a:p>
+          <a:p>
+            <a:pPr marL="285750" indent="-285750">
+              <a:buFont typeface="Arial" panose="020B0604020202020204" pitchFamily="34" charset="0"/>
+              <a:buChar char="•"/>
+            </a:pPr>
+            <a:endParaRPr lang="en-US" sz="1800" dirty="0"/>
+          </a:p>
+          <a:p>
+            <a:pPr marL="285750" indent="-285750">
+              <a:buFont typeface="Arial" panose="020B0604020202020204" pitchFamily="34" charset="0"/>
+              <a:buChar char="•"/>
+            </a:pPr>
+            <a:r>
+              <a:rPr lang="en-US" sz="1800" dirty="0"/>
+              <a:t>Un modulo que ‘lee’ el valor del </a:t>
+            </a:r>
+            <a:r>
+              <a:rPr lang="en-US" sz="1800" dirty="0" err="1"/>
+              <a:t>cronometro</a:t>
+            </a:r>
+            <a:r>
+              <a:rPr lang="en-US" sz="1800" dirty="0"/>
+              <a:t> y lo </a:t>
+            </a:r>
+            <a:r>
+              <a:rPr lang="en-US" sz="1800" dirty="0" err="1"/>
+              <a:t>dibuja</a:t>
+            </a:r>
+            <a:r>
+              <a:rPr lang="en-US" sz="1800" dirty="0"/>
+              <a:t> </a:t>
+            </a:r>
+            <a:r>
+              <a:rPr lang="en-US" sz="1800" dirty="0" err="1"/>
+              <a:t>en</a:t>
+            </a:r>
+            <a:r>
+              <a:rPr lang="en-US" sz="1800" dirty="0"/>
+              <a:t> </a:t>
+            </a:r>
+            <a:r>
+              <a:rPr lang="en-US" sz="1800" dirty="0" err="1"/>
+              <a:t>pantalla</a:t>
+            </a:r>
+            <a:r>
+              <a:rPr lang="en-US" sz="1800" dirty="0"/>
+              <a:t>.</a:t>
+            </a:r>
+          </a:p>
+          <a:p>
+            <a:pPr marL="285750" indent="-285750">
+              <a:buFont typeface="Arial" panose="020B0604020202020204" pitchFamily="34" charset="0"/>
+              <a:buChar char="•"/>
+            </a:pPr>
+            <a:endParaRPr lang="en-US" sz="1800" dirty="0"/>
+          </a:p>
+          <a:p>
+            <a:pPr marL="285750" indent="-285750">
+              <a:buFont typeface="Arial" panose="020B0604020202020204" pitchFamily="34" charset="0"/>
+              <a:buChar char="•"/>
+            </a:pPr>
+            <a:r>
+              <a:rPr lang="en-US" sz="1800" dirty="0"/>
+              <a:t>PLL’s</a:t>
+            </a:r>
           </a:p>
         </p:txBody>
       </p:sp>
     </p:spTree>
     <p:extLst>
       <p:ext uri="{BB962C8B-B14F-4D97-AF65-F5344CB8AC3E}">
-        <p14:creationId xmlns:p14="http://schemas.microsoft.com/office/powerpoint/2010/main" val="2210359684"/>
+        <p14:creationId xmlns:p14="http://schemas.microsoft.com/office/powerpoint/2010/main" val="629562670"/>
       </p:ext>
     </p:extLst>
   </p:cSld>
@@ -3898,27 +4233,98 @@
             <p:ph type="title"/>
           </p:nvPr>
         </p:nvSpPr>
-        <p:spPr/>
-        <p:txBody>
-          <a:bodyPr/>
-          <a:lstStyle/>
-          <a:p>
-            <a:endParaRPr lang="es-AR" dirty="0"/>
-          </a:p>
-        </p:txBody>
-      </p:sp>
-      <p:sp>
-        <p:nvSpPr>
-          <p:cNvPr id="3" name="2 Marcador de posición de imagen"/>
-          <p:cNvSpPr>
-            <a:spLocks noGrp="1"/>
-          </p:cNvSpPr>
+        <p:spPr>
+          <a:xfrm>
+            <a:off x="914400" y="762000"/>
+            <a:ext cx="2953512" cy="685800"/>
+          </a:xfrm>
+        </p:spPr>
+        <p:txBody>
+          <a:bodyPr/>
+          <a:lstStyle/>
+          <a:p>
+            <a:pPr algn="ctr"/>
+            <a:r>
+              <a:rPr lang="es-AR" dirty="0"/>
+              <a:t>Contador</a:t>
+            </a:r>
+          </a:p>
+        </p:txBody>
+      </p:sp>
+      <p:pic>
+        <p:nvPicPr>
+          <p:cNvPr id="14" name="Marcador de posición de imagen 13">
+            <a:extLst>
+              <a:ext uri="{FF2B5EF4-FFF2-40B4-BE49-F238E27FC236}">
+                <a16:creationId xmlns:a16="http://schemas.microsoft.com/office/drawing/2014/main" id="{FE90E9C1-5D8B-4A25-A965-2CF1BEC6D3B6}"/>
+              </a:ext>
+            </a:extLst>
+          </p:cNvPr>
+          <p:cNvPicPr>
+            <a:picLocks noGrp="1" noChangeAspect="1"/>
+          </p:cNvPicPr>
           <p:nvPr>
             <p:ph type="pic" idx="1"/>
           </p:nvPr>
-        </p:nvSpPr>
-        <p:spPr/>
-      </p:sp>
+        </p:nvPicPr>
+        <p:blipFill rotWithShape="1">
+          <a:blip r:embed="rId2">
+            <a:extLst>
+              <a:ext uri="{28A0092B-C50C-407E-A947-70E740481C1C}">
+                <a14:useLocalDpi xmlns:a14="http://schemas.microsoft.com/office/drawing/2010/main" val="0"/>
+              </a:ext>
+            </a:extLst>
+          </a:blip>
+          <a:srcRect l="1326" r="1326"/>
+          <a:stretch/>
+        </p:blipFill>
+        <p:spPr>
+          <a:xfrm>
+            <a:off x="4114800" y="2202198"/>
+            <a:ext cx="4628388" cy="2453603"/>
+          </a:xfrm>
+          <a:prstGeom prst="rect">
+            <a:avLst/>
+          </a:prstGeom>
+          <a:solidFill>
+            <a:schemeClr val="bg2">
+              <a:lumMod val="25000"/>
+              <a:lumOff val="75000"/>
+            </a:schemeClr>
+          </a:solidFill>
+          <a:ln w="88900" cap="sq">
+            <a:solidFill>
+              <a:srgbClr val="FFFFFF"/>
+            </a:solidFill>
+            <a:miter lim="800000"/>
+          </a:ln>
+          <a:effectLst>
+            <a:glow rad="127000">
+              <a:schemeClr val="bg1">
+                <a:lumMod val="50000"/>
+                <a:lumOff val="50000"/>
+              </a:schemeClr>
+            </a:glow>
+            <a:outerShdw blurRad="55000" dist="18000" dir="5400000" algn="tl" rotWithShape="0">
+              <a:srgbClr val="000000">
+                <a:alpha val="40000"/>
+              </a:srgbClr>
+            </a:outerShdw>
+          </a:effectLst>
+          <a:scene3d>
+            <a:camera prst="orthographicFront"/>
+            <a:lightRig rig="twoPt" dir="t">
+              <a:rot lat="0" lon="0" rev="7200000"/>
+            </a:lightRig>
+          </a:scene3d>
+          <a:sp3d>
+            <a:bevelT w="25400" h="19050"/>
+            <a:contourClr>
+              <a:srgbClr val="FFFFFF"/>
+            </a:contourClr>
+          </a:sp3d>
+        </p:spPr>
+      </p:pic>
       <p:sp>
         <p:nvSpPr>
           <p:cNvPr id="4" name="3 Marcador de texto"/>
@@ -3929,10 +4335,58 @@
             <p:ph type="body" sz="half" idx="2"/>
           </p:nvPr>
         </p:nvSpPr>
-        <p:spPr/>
-        <p:txBody>
-          <a:bodyPr/>
-          <a:lstStyle/>
+        <p:spPr>
+          <a:xfrm>
+            <a:off x="685800" y="1752600"/>
+            <a:ext cx="3182112" cy="4556760"/>
+          </a:xfrm>
+        </p:spPr>
+        <p:txBody>
+          <a:bodyPr/>
+          <a:lstStyle/>
+          <a:p>
+            <a:r>
+              <a:rPr lang="es-AR" sz="1800" dirty="0"/>
+              <a:t>Recibe un </a:t>
+            </a:r>
+            <a:r>
+              <a:rPr lang="es-AR" sz="1800" dirty="0" err="1"/>
+              <a:t>clock</a:t>
+            </a:r>
+            <a:r>
+              <a:rPr lang="es-AR" sz="1800" dirty="0"/>
+              <a:t> de 1KHz, una señal de START/STOP y una de </a:t>
+            </a:r>
+            <a:r>
+              <a:rPr lang="es-AR" sz="1800" dirty="0" err="1"/>
+              <a:t>reset</a:t>
+            </a:r>
+            <a:r>
+              <a:rPr lang="es-AR" sz="1800" dirty="0"/>
+              <a:t>.</a:t>
+            </a:r>
+          </a:p>
+          <a:p>
+            <a:endParaRPr lang="es-AR" sz="1800" dirty="0"/>
+          </a:p>
+          <a:p>
+            <a:r>
+              <a:rPr lang="es-AR" sz="1800" dirty="0"/>
+              <a:t>Las señal de START/STOP frena o activa el contador con cada flanco ascendente de la misma.</a:t>
+            </a:r>
+          </a:p>
+          <a:p>
+            <a:endParaRPr lang="es-AR" sz="1800" dirty="0"/>
+          </a:p>
+          <a:p>
+            <a:r>
+              <a:rPr lang="es-AR" sz="1800" dirty="0"/>
+              <a:t>Funciona como cronometro que va actualizando en su salida las horas, minutos, segundos y milisegundos.</a:t>
+            </a:r>
+          </a:p>
+          <a:p>
+            <a:endParaRPr lang="es-AR" sz="1800" dirty="0"/>
+          </a:p>
           <a:p>
             <a:endParaRPr lang="es-AR" dirty="0"/>
           </a:p>
@@ -3941,7 +4395,7 @@
     </p:spTree>
     <p:extLst>
       <p:ext uri="{BB962C8B-B14F-4D97-AF65-F5344CB8AC3E}">
-        <p14:creationId xmlns:p14="http://schemas.microsoft.com/office/powerpoint/2010/main" val="1170215356"/>
+        <p14:creationId xmlns:p14="http://schemas.microsoft.com/office/powerpoint/2010/main" val="2210359684"/>
       </p:ext>
     </p:extLst>
   </p:cSld>
@@ -3978,27 +4432,57 @@
             <p:ph type="title"/>
           </p:nvPr>
         </p:nvSpPr>
-        <p:spPr/>
-        <p:txBody>
-          <a:bodyPr/>
-          <a:lstStyle/>
-          <a:p>
-            <a:endParaRPr lang="es-AR" dirty="0"/>
-          </a:p>
-        </p:txBody>
-      </p:sp>
-      <p:sp>
-        <p:nvSpPr>
-          <p:cNvPr id="3" name="2 Marcador de posición de imagen"/>
-          <p:cNvSpPr>
-            <a:spLocks noGrp="1"/>
-          </p:cNvSpPr>
+        <p:spPr>
+          <a:xfrm>
+            <a:off x="685800" y="762000"/>
+            <a:ext cx="2953512" cy="853440"/>
+          </a:xfrm>
+        </p:spPr>
+        <p:txBody>
+          <a:bodyPr/>
+          <a:lstStyle/>
+          <a:p>
+            <a:r>
+              <a:rPr lang="es-AR" dirty="0"/>
+              <a:t>Controlador VGA</a:t>
+            </a:r>
+          </a:p>
+        </p:txBody>
+      </p:sp>
+      <p:pic>
+        <p:nvPicPr>
+          <p:cNvPr id="6" name="Marcador de posición de imagen 5">
+            <a:extLst>
+              <a:ext uri="{FF2B5EF4-FFF2-40B4-BE49-F238E27FC236}">
+                <a16:creationId xmlns:a16="http://schemas.microsoft.com/office/drawing/2014/main" id="{FCD3F638-92F0-428C-A7C0-64CB5C476CD2}"/>
+              </a:ext>
+            </a:extLst>
+          </p:cNvPr>
+          <p:cNvPicPr>
+            <a:picLocks noGrp="1" noChangeAspect="1"/>
+          </p:cNvPicPr>
           <p:nvPr>
             <p:ph type="pic" idx="1"/>
           </p:nvPr>
-        </p:nvSpPr>
-        <p:spPr/>
-      </p:sp>
+        </p:nvPicPr>
+        <p:blipFill rotWithShape="1">
+          <a:blip r:embed="rId2">
+            <a:extLst>
+              <a:ext uri="{28A0092B-C50C-407E-A947-70E740481C1C}">
+                <a14:useLocalDpi xmlns:a14="http://schemas.microsoft.com/office/drawing/2010/main" val="0"/>
+              </a:ext>
+            </a:extLst>
+          </a:blip>
+          <a:srcRect l="3540" r="13672"/>
+          <a:stretch/>
+        </p:blipFill>
+        <p:spPr>
+          <a:xfrm>
+            <a:off x="4114799" y="1981200"/>
+            <a:ext cx="3887031" cy="3657600"/>
+          </a:xfrm>
+        </p:spPr>
+      </p:pic>
       <p:sp>
         <p:nvSpPr>
           <p:cNvPr id="4" name="3 Marcador de texto"/>
@@ -4009,19 +4493,71 @@
             <p:ph type="body" sz="half" idx="2"/>
           </p:nvPr>
         </p:nvSpPr>
-        <p:spPr/>
-        <p:txBody>
-          <a:bodyPr/>
-          <a:lstStyle/>
-          <a:p>
-            <a:endParaRPr lang="es-AR" dirty="0"/>
+        <p:spPr>
+          <a:xfrm>
+            <a:off x="381000" y="1828800"/>
+            <a:ext cx="3486912" cy="4480560"/>
+          </a:xfrm>
+        </p:spPr>
+        <p:txBody>
+          <a:bodyPr>
+            <a:normAutofit/>
+          </a:bodyPr>
+          <a:lstStyle/>
+          <a:p>
+            <a:r>
+              <a:rPr lang="es-AR" sz="1800" dirty="0"/>
+              <a:t>Se ocupa de manejar el protocolo VGA y decirle al siguiente modulo donde dibujar.</a:t>
+            </a:r>
+          </a:p>
+          <a:p>
+            <a:endParaRPr lang="es-AR" sz="1800" dirty="0"/>
+          </a:p>
+          <a:p>
+            <a:r>
+              <a:rPr lang="es-AR" sz="1800" dirty="0"/>
+              <a:t>Genera las señales de </a:t>
+            </a:r>
+            <a:r>
+              <a:rPr lang="es-AR" sz="1800" dirty="0" err="1"/>
+              <a:t>h_sync</a:t>
+            </a:r>
+            <a:r>
+              <a:rPr lang="es-AR" sz="1800" dirty="0"/>
+              <a:t> y de </a:t>
+            </a:r>
+            <a:r>
+              <a:rPr lang="es-AR" sz="1800" dirty="0" err="1"/>
+              <a:t>v_sync</a:t>
+            </a:r>
+            <a:r>
+              <a:rPr lang="es-AR" sz="1800" dirty="0"/>
+              <a:t>, así también como una señal de </a:t>
+            </a:r>
+            <a:r>
+              <a:rPr lang="es-AR" sz="1800" dirty="0" err="1"/>
+              <a:t>enable</a:t>
+            </a:r>
+            <a:r>
+              <a:rPr lang="es-AR" sz="1800" dirty="0"/>
+              <a:t> que avisa cuando se esta barriendo la región visible del monitor.</a:t>
+            </a:r>
+          </a:p>
+          <a:p>
+            <a:endParaRPr lang="es-AR" sz="1800" dirty="0"/>
+          </a:p>
+          <a:p>
+            <a:r>
+              <a:rPr lang="es-AR" sz="1800" dirty="0"/>
+              <a:t>Devuelve la fila y la columna que se debe actualizar en pantalla.</a:t>
+            </a:r>
           </a:p>
         </p:txBody>
       </p:sp>
     </p:spTree>
     <p:extLst>
       <p:ext uri="{BB962C8B-B14F-4D97-AF65-F5344CB8AC3E}">
-        <p14:creationId xmlns:p14="http://schemas.microsoft.com/office/powerpoint/2010/main" val="3536972410"/>
+        <p14:creationId xmlns:p14="http://schemas.microsoft.com/office/powerpoint/2010/main" val="1170215356"/>
       </p:ext>
     </p:extLst>
   </p:cSld>
@@ -4058,27 +4594,67 @@
             <p:ph type="title"/>
           </p:nvPr>
         </p:nvSpPr>
-        <p:spPr/>
-        <p:txBody>
-          <a:bodyPr/>
-          <a:lstStyle/>
-          <a:p>
+        <p:spPr>
+          <a:xfrm>
+            <a:off x="892126" y="516988"/>
+            <a:ext cx="2975786" cy="778412"/>
+          </a:xfrm>
+        </p:spPr>
+        <p:txBody>
+          <a:bodyPr/>
+          <a:lstStyle/>
+          <a:p>
+            <a:pPr algn="ctr"/>
+            <a:r>
+              <a:rPr lang="es-AR" dirty="0" err="1"/>
+              <a:t>Image</a:t>
+            </a:r>
+            <a:r>
+              <a:rPr lang="es-AR" dirty="0"/>
+              <a:t> </a:t>
+            </a:r>
+            <a:r>
+              <a:rPr lang="es-AR" dirty="0" err="1"/>
+              <a:t>Drawer</a:t>
+            </a:r>
             <a:endParaRPr lang="es-AR" dirty="0"/>
           </a:p>
         </p:txBody>
       </p:sp>
-      <p:sp>
-        <p:nvSpPr>
-          <p:cNvPr id="3" name="2 Marcador de posición de imagen"/>
-          <p:cNvSpPr>
-            <a:spLocks noGrp="1"/>
-          </p:cNvSpPr>
+      <p:pic>
+        <p:nvPicPr>
+          <p:cNvPr id="6" name="Marcador de posición de imagen 5">
+            <a:extLst>
+              <a:ext uri="{FF2B5EF4-FFF2-40B4-BE49-F238E27FC236}">
+                <a16:creationId xmlns:a16="http://schemas.microsoft.com/office/drawing/2014/main" id="{A13BE25A-854C-4B66-89DD-A27A0CCA3C89}"/>
+              </a:ext>
+            </a:extLst>
+          </p:cNvPr>
+          <p:cNvPicPr>
+            <a:picLocks noGrp="1" noChangeAspect="1"/>
+          </p:cNvPicPr>
           <p:nvPr>
             <p:ph type="pic" idx="1"/>
           </p:nvPr>
-        </p:nvSpPr>
-        <p:spPr/>
-      </p:sp>
+        </p:nvPicPr>
+        <p:blipFill rotWithShape="1">
+          <a:blip r:embed="rId2">
+            <a:extLst>
+              <a:ext uri="{28A0092B-C50C-407E-A947-70E740481C1C}">
+                <a14:useLocalDpi xmlns:a14="http://schemas.microsoft.com/office/drawing/2010/main" val="0"/>
+              </a:ext>
+            </a:extLst>
+          </a:blip>
+          <a:srcRect t="1007" b="13982"/>
+          <a:stretch/>
+        </p:blipFill>
+        <p:spPr>
+          <a:xfrm>
+            <a:off x="4191000" y="1828800"/>
+            <a:ext cx="4038600" cy="3733800"/>
+          </a:xfrm>
+        </p:spPr>
+      </p:pic>
       <p:sp>
         <p:nvSpPr>
           <p:cNvPr id="4" name="3 Marcador de texto"/>
@@ -4089,10 +4665,44 @@
             <p:ph type="body" sz="half" idx="2"/>
           </p:nvPr>
         </p:nvSpPr>
-        <p:spPr/>
-        <p:txBody>
-          <a:bodyPr/>
-          <a:lstStyle/>
+        <p:spPr>
+          <a:xfrm>
+            <a:off x="457200" y="1447800"/>
+            <a:ext cx="3505200" cy="4861560"/>
+          </a:xfrm>
+        </p:spPr>
+        <p:txBody>
+          <a:bodyPr>
+            <a:normAutofit lnSpcReduction="10000"/>
+          </a:bodyPr>
+          <a:lstStyle/>
+          <a:p>
+            <a:r>
+              <a:rPr lang="es-AR" sz="2000" dirty="0"/>
+              <a:t>Traduce el tiempo que le llega del cronometro a como debe verse cada digito en el display.</a:t>
+            </a:r>
+          </a:p>
+          <a:p>
+            <a:endParaRPr lang="es-AR" sz="2000" dirty="0"/>
+          </a:p>
+          <a:p>
+            <a:r>
+              <a:rPr lang="es-AR" sz="2000" dirty="0"/>
+              <a:t>Internamente implementa una FSM de 11 estados(uno por cada símbolo) para saber cual es el símbolo que debe dibujar.</a:t>
+            </a:r>
+          </a:p>
+          <a:p>
+            <a:endParaRPr lang="es-AR" sz="2000" dirty="0"/>
+          </a:p>
+          <a:p>
+            <a:r>
+              <a:rPr lang="es-AR" sz="2000" dirty="0"/>
+              <a:t>A la salida se comunica directamente con los pines R, G, B de la entrada del monitor VGA.</a:t>
+            </a:r>
+          </a:p>
+          <a:p>
+            <a:endParaRPr lang="es-AR" sz="1800" dirty="0"/>
+          </a:p>
           <a:p>
             <a:endParaRPr lang="es-AR" dirty="0"/>
           </a:p>
@@ -4101,7 +4711,7 @@
     </p:spTree>
     <p:extLst>
       <p:ext uri="{BB962C8B-B14F-4D97-AF65-F5344CB8AC3E}">
-        <p14:creationId xmlns:p14="http://schemas.microsoft.com/office/powerpoint/2010/main" val="1683336039"/>
+        <p14:creationId xmlns:p14="http://schemas.microsoft.com/office/powerpoint/2010/main" val="3536972410"/>
       </p:ext>
     </p:extLst>
   </p:cSld>
@@ -4181,7 +4791,7 @@
     </p:spTree>
     <p:extLst>
       <p:ext uri="{BB962C8B-B14F-4D97-AF65-F5344CB8AC3E}">
-        <p14:creationId xmlns:p14="http://schemas.microsoft.com/office/powerpoint/2010/main" val="1635586395"/>
+        <p14:creationId xmlns:p14="http://schemas.microsoft.com/office/powerpoint/2010/main" val="1683336039"/>
       </p:ext>
     </p:extLst>
   </p:cSld>

</xml_diff>